<commit_message>
A bunch of figures and texts added!
</commit_message>
<xml_diff>
--- a/journalWallFriction/pictures/pdf/Zaxis.pptx
+++ b/journalWallFriction/pictures/pdf/Zaxis.pptx
@@ -243,7 +243,7 @@
           <a:p>
             <a:fld id="{C4198793-6D4C-E343-B515-791BB472C93A}" type="datetimeFigureOut">
               <a:rPr lang="en-US" smtClean="0"/>
-              <a:t>5/1/18</a:t>
+              <a:t>5/7/18</a:t>
             </a:fld>
             <a:endParaRPr lang="en-US"/>
           </a:p>
@@ -413,7 +413,7 @@
           <a:p>
             <a:fld id="{C4198793-6D4C-E343-B515-791BB472C93A}" type="datetimeFigureOut">
               <a:rPr lang="en-US" smtClean="0"/>
-              <a:t>5/1/18</a:t>
+              <a:t>5/7/18</a:t>
             </a:fld>
             <a:endParaRPr lang="en-US"/>
           </a:p>
@@ -593,7 +593,7 @@
           <a:p>
             <a:fld id="{C4198793-6D4C-E343-B515-791BB472C93A}" type="datetimeFigureOut">
               <a:rPr lang="en-US" smtClean="0"/>
-              <a:t>5/1/18</a:t>
+              <a:t>5/7/18</a:t>
             </a:fld>
             <a:endParaRPr lang="en-US"/>
           </a:p>
@@ -763,7 +763,7 @@
           <a:p>
             <a:fld id="{C4198793-6D4C-E343-B515-791BB472C93A}" type="datetimeFigureOut">
               <a:rPr lang="en-US" smtClean="0"/>
-              <a:t>5/1/18</a:t>
+              <a:t>5/7/18</a:t>
             </a:fld>
             <a:endParaRPr lang="en-US"/>
           </a:p>
@@ -1009,7 +1009,7 @@
           <a:p>
             <a:fld id="{C4198793-6D4C-E343-B515-791BB472C93A}" type="datetimeFigureOut">
               <a:rPr lang="en-US" smtClean="0"/>
-              <a:t>5/1/18</a:t>
+              <a:t>5/7/18</a:t>
             </a:fld>
             <a:endParaRPr lang="en-US"/>
           </a:p>
@@ -1241,7 +1241,7 @@
           <a:p>
             <a:fld id="{C4198793-6D4C-E343-B515-791BB472C93A}" type="datetimeFigureOut">
               <a:rPr lang="en-US" smtClean="0"/>
-              <a:t>5/1/18</a:t>
+              <a:t>5/7/18</a:t>
             </a:fld>
             <a:endParaRPr lang="en-US"/>
           </a:p>
@@ -1608,7 +1608,7 @@
           <a:p>
             <a:fld id="{C4198793-6D4C-E343-B515-791BB472C93A}" type="datetimeFigureOut">
               <a:rPr lang="en-US" smtClean="0"/>
-              <a:t>5/1/18</a:t>
+              <a:t>5/7/18</a:t>
             </a:fld>
             <a:endParaRPr lang="en-US"/>
           </a:p>
@@ -1726,7 +1726,7 @@
           <a:p>
             <a:fld id="{C4198793-6D4C-E343-B515-791BB472C93A}" type="datetimeFigureOut">
               <a:rPr lang="en-US" smtClean="0"/>
-              <a:t>5/1/18</a:t>
+              <a:t>5/7/18</a:t>
             </a:fld>
             <a:endParaRPr lang="en-US"/>
           </a:p>
@@ -1821,7 +1821,7 @@
           <a:p>
             <a:fld id="{C4198793-6D4C-E343-B515-791BB472C93A}" type="datetimeFigureOut">
               <a:rPr lang="en-US" smtClean="0"/>
-              <a:t>5/1/18</a:t>
+              <a:t>5/7/18</a:t>
             </a:fld>
             <a:endParaRPr lang="en-US"/>
           </a:p>
@@ -2098,7 +2098,7 @@
           <a:p>
             <a:fld id="{C4198793-6D4C-E343-B515-791BB472C93A}" type="datetimeFigureOut">
               <a:rPr lang="en-US" smtClean="0"/>
-              <a:t>5/1/18</a:t>
+              <a:t>5/7/18</a:t>
             </a:fld>
             <a:endParaRPr lang="en-US"/>
           </a:p>
@@ -2355,7 +2355,7 @@
           <a:p>
             <a:fld id="{C4198793-6D4C-E343-B515-791BB472C93A}" type="datetimeFigureOut">
               <a:rPr lang="en-US" smtClean="0"/>
-              <a:t>5/1/18</a:t>
+              <a:t>5/7/18</a:t>
             </a:fld>
             <a:endParaRPr lang="en-US"/>
           </a:p>
@@ -2568,7 +2568,7 @@
           <a:p>
             <a:fld id="{C4198793-6D4C-E343-B515-791BB472C93A}" type="datetimeFigureOut">
               <a:rPr lang="en-US" smtClean="0"/>
-              <a:t>5/1/18</a:t>
+              <a:t>5/7/18</a:t>
             </a:fld>
             <a:endParaRPr lang="en-US"/>
           </a:p>
@@ -3270,7 +3270,7 @@
           </a:prstGeom>
           <a:ln w="34925">
             <a:solidFill>
-              <a:srgbClr val="0070C0"/>
+              <a:srgbClr val="FF0000"/>
             </a:solidFill>
             <a:tailEnd type="triangle"/>
           </a:ln>
@@ -3312,7 +3312,7 @@
           </a:prstGeom>
           <a:ln w="34925">
             <a:solidFill>
-              <a:srgbClr val="0070C0"/>
+              <a:srgbClr val="FF0000"/>
             </a:solidFill>
             <a:tailEnd type="triangle"/>
           </a:ln>
@@ -3354,7 +3354,9 @@
           </a:prstGeom>
           <a:ln w="34925">
             <a:solidFill>
-              <a:srgbClr val="FF0000"/>
+              <a:schemeClr val="accent1">
+                <a:lumMod val="75000"/>
+              </a:schemeClr>
             </a:solidFill>
             <a:tailEnd type="triangle"/>
           </a:ln>
@@ -3660,7 +3662,9 @@
           </a:prstGeom>
           <a:ln w="34925">
             <a:solidFill>
-              <a:srgbClr val="FF0000"/>
+              <a:schemeClr val="accent1">
+                <a:lumMod val="75000"/>
+              </a:schemeClr>
             </a:solidFill>
             <a:tailEnd type="triangle"/>
           </a:ln>
@@ -4810,63 +4814,6 @@
       </p:sp>
       <p:sp>
         <p:nvSpPr>
-          <p:cNvPr id="9" name="Up-Down Arrow 8">
-            <a:extLst>
-              <a:ext uri="{FF2B5EF4-FFF2-40B4-BE49-F238E27FC236}">
-                <a16:creationId xmlns:a16="http://schemas.microsoft.com/office/drawing/2014/main" id="{2FCC8230-98D5-7B4A-B638-7F2C67CABAAC}"/>
-              </a:ext>
-            </a:extLst>
-          </p:cNvPr>
-          <p:cNvSpPr/>
-          <p:nvPr/>
-        </p:nvSpPr>
-        <p:spPr>
-          <a:xfrm>
-            <a:off x="10342221" y="3684276"/>
-            <a:ext cx="571197" cy="1330338"/>
-          </a:xfrm>
-          <a:prstGeom prst="upDownArrow">
-            <a:avLst>
-              <a:gd name="adj1" fmla="val 39955"/>
-              <a:gd name="adj2" fmla="val 50000"/>
-            </a:avLst>
-          </a:prstGeom>
-          <a:solidFill>
-            <a:schemeClr val="tx1">
-              <a:alpha val="49000"/>
-            </a:schemeClr>
-          </a:solidFill>
-          <a:ln>
-            <a:noFill/>
-          </a:ln>
-        </p:spPr>
-        <p:style>
-          <a:lnRef idx="2">
-            <a:schemeClr val="accent1">
-              <a:shade val="50000"/>
-            </a:schemeClr>
-          </a:lnRef>
-          <a:fillRef idx="1">
-            <a:schemeClr val="accent1"/>
-          </a:fillRef>
-          <a:effectRef idx="0">
-            <a:schemeClr val="accent1"/>
-          </a:effectRef>
-          <a:fontRef idx="minor">
-            <a:schemeClr val="lt1"/>
-          </a:fontRef>
-        </p:style>
-        <p:txBody>
-          <a:bodyPr rtlCol="0" anchor="ctr"/>
-          <a:lstStyle/>
-          <a:p>
-            <a:pPr algn="ctr"/>
-            <a:endParaRPr lang="en-US"/>
-          </a:p>
-        </p:txBody>
-      </p:sp>
-      <p:sp>
-        <p:nvSpPr>
           <p:cNvPr id="68" name="Chord 67">
             <a:extLst>
               <a:ext uri="{FF2B5EF4-FFF2-40B4-BE49-F238E27FC236}">
@@ -4896,6 +4843,200 @@
           <a:ln>
             <a:noFill/>
           </a:ln>
+        </p:spPr>
+        <p:style>
+          <a:lnRef idx="2">
+            <a:schemeClr val="accent1">
+              <a:shade val="50000"/>
+            </a:schemeClr>
+          </a:lnRef>
+          <a:fillRef idx="1">
+            <a:schemeClr val="accent1"/>
+          </a:fillRef>
+          <a:effectRef idx="0">
+            <a:schemeClr val="accent1"/>
+          </a:effectRef>
+          <a:fontRef idx="minor">
+            <a:schemeClr val="lt1"/>
+          </a:fontRef>
+        </p:style>
+        <p:txBody>
+          <a:bodyPr rtlCol="0" anchor="ctr"/>
+          <a:lstStyle/>
+          <a:p>
+            <a:pPr algn="ctr"/>
+            <a:endParaRPr lang="en-US"/>
+          </a:p>
+        </p:txBody>
+      </p:sp>
+      <p:cxnSp>
+        <p:nvCxnSpPr>
+          <p:cNvPr id="43" name="Straight Arrow Connector 42">
+            <a:extLst>
+              <a:ext uri="{FF2B5EF4-FFF2-40B4-BE49-F238E27FC236}">
+                <a16:creationId xmlns:a16="http://schemas.microsoft.com/office/drawing/2014/main" id="{BFF6101D-0535-F54B-9BF6-2A5722C58972}"/>
+              </a:ext>
+            </a:extLst>
+          </p:cNvPr>
+          <p:cNvCxnSpPr/>
+          <p:nvPr/>
+        </p:nvCxnSpPr>
+        <p:spPr>
+          <a:xfrm flipH="1" flipV="1">
+            <a:off x="11034227" y="4388412"/>
+            <a:ext cx="177113" cy="213212"/>
+          </a:xfrm>
+          <a:prstGeom prst="straightConnector1">
+            <a:avLst/>
+          </a:prstGeom>
+          <a:ln w="34925">
+            <a:solidFill>
+              <a:schemeClr val="accent1">
+                <a:lumMod val="75000"/>
+              </a:schemeClr>
+            </a:solidFill>
+            <a:tailEnd type="triangle"/>
+          </a:ln>
+        </p:spPr>
+        <p:style>
+          <a:lnRef idx="1">
+            <a:schemeClr val="accent1"/>
+          </a:lnRef>
+          <a:fillRef idx="0">
+            <a:schemeClr val="accent1"/>
+          </a:fillRef>
+          <a:effectRef idx="0">
+            <a:schemeClr val="accent1"/>
+          </a:effectRef>
+          <a:fontRef idx="minor">
+            <a:schemeClr val="tx1"/>
+          </a:fontRef>
+        </p:style>
+      </p:cxnSp>
+      <p:cxnSp>
+        <p:nvCxnSpPr>
+          <p:cNvPr id="44" name="Straight Arrow Connector 43">
+            <a:extLst>
+              <a:ext uri="{FF2B5EF4-FFF2-40B4-BE49-F238E27FC236}">
+                <a16:creationId xmlns:a16="http://schemas.microsoft.com/office/drawing/2014/main" id="{E16600B8-CDA0-1F4F-A4B9-AA66AA3DE946}"/>
+              </a:ext>
+            </a:extLst>
+          </p:cNvPr>
+          <p:cNvCxnSpPr>
+            <a:cxnSpLocks/>
+          </p:cNvCxnSpPr>
+          <p:nvPr/>
+        </p:nvCxnSpPr>
+        <p:spPr>
+          <a:xfrm flipH="1" flipV="1">
+            <a:off x="7893153" y="2253382"/>
+            <a:ext cx="177113" cy="213212"/>
+          </a:xfrm>
+          <a:prstGeom prst="straightConnector1">
+            <a:avLst/>
+          </a:prstGeom>
+          <a:ln w="34925">
+            <a:solidFill>
+              <a:schemeClr val="accent1">
+                <a:lumMod val="75000"/>
+              </a:schemeClr>
+            </a:solidFill>
+            <a:tailEnd type="triangle"/>
+          </a:ln>
+        </p:spPr>
+        <p:style>
+          <a:lnRef idx="1">
+            <a:schemeClr val="accent1"/>
+          </a:lnRef>
+          <a:fillRef idx="0">
+            <a:schemeClr val="accent1"/>
+          </a:fillRef>
+          <a:effectRef idx="0">
+            <a:schemeClr val="accent1"/>
+          </a:effectRef>
+          <a:fontRef idx="minor">
+            <a:schemeClr val="tx1"/>
+          </a:fontRef>
+        </p:style>
+      </p:cxnSp>
+      <p:sp>
+        <p:nvSpPr>
+          <p:cNvPr id="4" name="Down Arrow 3">
+            <a:extLst>
+              <a:ext uri="{FF2B5EF4-FFF2-40B4-BE49-F238E27FC236}">
+                <a16:creationId xmlns:a16="http://schemas.microsoft.com/office/drawing/2014/main" id="{5FEB3181-2040-7E4F-97BB-D4E91C9D058D}"/>
+              </a:ext>
+            </a:extLst>
+          </p:cNvPr>
+          <p:cNvSpPr/>
+          <p:nvPr/>
+        </p:nvSpPr>
+        <p:spPr>
+          <a:xfrm>
+            <a:off x="8031499" y="6110239"/>
+            <a:ext cx="351981" cy="566418"/>
+          </a:xfrm>
+          <a:prstGeom prst="downArrow">
+            <a:avLst/>
+          </a:prstGeom>
+          <a:solidFill>
+            <a:schemeClr val="tx2">
+              <a:lumMod val="75000"/>
+              <a:alpha val="64000"/>
+            </a:schemeClr>
+          </a:solidFill>
+        </p:spPr>
+        <p:style>
+          <a:lnRef idx="2">
+            <a:schemeClr val="accent1">
+              <a:shade val="50000"/>
+            </a:schemeClr>
+          </a:lnRef>
+          <a:fillRef idx="1">
+            <a:schemeClr val="accent1"/>
+          </a:fillRef>
+          <a:effectRef idx="0">
+            <a:schemeClr val="accent1"/>
+          </a:effectRef>
+          <a:fontRef idx="minor">
+            <a:schemeClr val="lt1"/>
+          </a:fontRef>
+        </p:style>
+        <p:txBody>
+          <a:bodyPr rtlCol="0" anchor="ctr"/>
+          <a:lstStyle/>
+          <a:p>
+            <a:pPr algn="ctr"/>
+            <a:endParaRPr lang="en-US"/>
+          </a:p>
+        </p:txBody>
+      </p:sp>
+      <p:sp>
+        <p:nvSpPr>
+          <p:cNvPr id="52" name="Down Arrow 51">
+            <a:extLst>
+              <a:ext uri="{FF2B5EF4-FFF2-40B4-BE49-F238E27FC236}">
+                <a16:creationId xmlns:a16="http://schemas.microsoft.com/office/drawing/2014/main" id="{6E6AE7CC-028C-514A-94BA-24979A1FE4E4}"/>
+              </a:ext>
+            </a:extLst>
+          </p:cNvPr>
+          <p:cNvSpPr/>
+          <p:nvPr/>
+        </p:nvSpPr>
+        <p:spPr>
+          <a:xfrm rot="10800000">
+            <a:off x="8031499" y="798174"/>
+            <a:ext cx="351981" cy="566418"/>
+          </a:xfrm>
+          <a:prstGeom prst="downArrow">
+            <a:avLst/>
+          </a:prstGeom>
+          <a:solidFill>
+            <a:schemeClr val="tx2">
+              <a:lumMod val="75000"/>
+              <a:alpha val="64000"/>
+            </a:schemeClr>
+          </a:solidFill>
         </p:spPr>
         <p:style>
           <a:lnRef idx="2">

</xml_diff>